<commit_message>
finished 90% of report, just need to rerun simpleseg with no data augmentation
</commit_message>
<xml_diff>
--- a/proj5_report.pptx
+++ b/proj5_report.pptx
@@ -1170,7 +1170,7 @@
         </p:nvSpPr>
         <p:spPr>
           <a:xfrm>
-            <a:off x="381300" y="685800"/>
+            <a:off x="381000" y="685800"/>
             <a:ext cx="6096000" cy="3429000"/>
           </a:xfrm>
           <a:custGeom>
@@ -14164,7 +14164,13 @@
         <p:nvGraphicFramePr>
           <p:cNvPr id="107" name="Google Shape;107;p26"/>
           <p:cNvGraphicFramePr/>
-          <p:nvPr/>
+          <p:nvPr>
+            <p:extLst>
+              <p:ext uri="{D42A27DB-BD31-4B8C-83A1-F6EECF244321}">
+                <p14:modId xmlns:p14="http://schemas.microsoft.com/office/powerpoint/2010/main" val="4028060596"/>
+              </p:ext>
+            </p:extLst>
+          </p:nvPr>
         </p:nvGraphicFramePr>
         <p:xfrm>
           <a:off x="595263" y="1693450"/>
@@ -14329,7 +14335,7 @@
                         </a:spcAft>
                         <a:buNone/>
                       </a:pPr>
-                      <a:endParaRPr/>
+                      <a:endParaRPr dirty="0"/>
                     </a:p>
                   </a:txBody>
                   <a:tcPr marL="91425" marR="91425" marT="91425" marB="91425"/>
@@ -14379,7 +14385,7 @@
                         </a:spcAft>
                         <a:buNone/>
                       </a:pPr>
-                      <a:endParaRPr/>
+                      <a:endParaRPr dirty="0"/>
                     </a:p>
                   </a:txBody>
                   <a:tcPr marL="91425" marR="91425" marT="91425" marB="91425"/>
@@ -14448,7 +14454,11 @@
                         </a:spcAft>
                         <a:buNone/>
                       </a:pPr>
-                      <a:endParaRPr/>
+                      <a:r>
+                        <a:rPr lang="en-US" dirty="0"/>
+                        <a:t>0.4479</a:t>
+                      </a:r>
+                      <a:endParaRPr dirty="0"/>
                     </a:p>
                   </a:txBody>
                   <a:tcPr marL="91425" marR="91425" marT="91425" marB="91425"/>
@@ -14467,7 +14477,11 @@
                         </a:spcAft>
                         <a:buNone/>
                       </a:pPr>
-                      <a:endParaRPr/>
+                      <a:r>
+                        <a:rPr lang="en-US" dirty="0"/>
+                        <a:t>0.4767</a:t>
+                      </a:r>
+                      <a:endParaRPr dirty="0"/>
                     </a:p>
                   </a:txBody>
                   <a:tcPr marL="91425" marR="91425" marT="91425" marB="91425"/>
@@ -14516,6 +14530,10 @@
                         </a:spcAft>
                         <a:buNone/>
                       </a:pPr>
+                      <a:r>
+                        <a:rPr lang="en-US" dirty="0"/>
+                        <a:t>0.5734</a:t>
+                      </a:r>
                       <a:endParaRPr dirty="0"/>
                     </a:p>
                   </a:txBody>
@@ -14535,7 +14553,11 @@
                         </a:spcAft>
                         <a:buNone/>
                       </a:pPr>
-                      <a:endParaRPr/>
+                      <a:r>
+                        <a:rPr lang="en-US" dirty="0"/>
+                        <a:t>0.5931</a:t>
+                      </a:r>
+                      <a:endParaRPr dirty="0"/>
                     </a:p>
                   </a:txBody>
                   <a:tcPr marL="91425" marR="91425" marT="91425" marB="91425"/>
@@ -14585,6 +14607,10 @@
                         </a:spcAft>
                         <a:buNone/>
                       </a:pPr>
+                      <a:r>
+                        <a:rPr lang="en-US" dirty="0"/>
+                        <a:t>0.6001</a:t>
+                      </a:r>
                       <a:endParaRPr dirty="0"/>
                     </a:p>
                   </a:txBody>
@@ -14604,7 +14630,11 @@
                         </a:spcAft>
                         <a:buNone/>
                       </a:pPr>
-                      <a:endParaRPr/>
+                      <a:r>
+                        <a:rPr lang="en-US" dirty="0"/>
+                        <a:t>0.6069</a:t>
+                      </a:r>
+                      <a:endParaRPr dirty="0"/>
                     </a:p>
                   </a:txBody>
                   <a:tcPr marL="91425" marR="91425" marT="91425" marB="91425"/>
@@ -14654,7 +14684,11 @@
                         </a:spcAft>
                         <a:buNone/>
                       </a:pPr>
-                      <a:endParaRPr/>
+                      <a:r>
+                        <a:rPr lang="en-US" dirty="0"/>
+                        <a:t>0.6426</a:t>
+                      </a:r>
+                      <a:endParaRPr dirty="0"/>
                     </a:p>
                   </a:txBody>
                   <a:tcPr marL="91425" marR="91425" marT="91425" marB="91425"/>
@@ -14673,6 +14707,10 @@
                         </a:spcAft>
                         <a:buNone/>
                       </a:pPr>
+                      <a:r>
+                        <a:rPr lang="en-US" dirty="0"/>
+                        <a:t>0.6291</a:t>
+                      </a:r>
                       <a:endParaRPr dirty="0"/>
                     </a:p>
                   </a:txBody>
@@ -14804,7 +14842,7 @@
           <p:nvPr>
             <p:extLst>
               <p:ext uri="{D42A27DB-BD31-4B8C-83A1-F6EECF244321}">
-                <p14:modId xmlns:p14="http://schemas.microsoft.com/office/powerpoint/2010/main" val="1772687027"/>
+                <p14:modId xmlns:p14="http://schemas.microsoft.com/office/powerpoint/2010/main" val="4290517642"/>
               </p:ext>
             </p:extLst>
           </p:nvPr>
@@ -15010,6 +15048,10 @@
                         </a:spcAft>
                         <a:buNone/>
                       </a:pPr>
+                      <a:r>
+                        <a:rPr lang="en-US" sz="900" dirty="0"/>
+                        <a:t>0.7711</a:t>
+                      </a:r>
                       <a:endParaRPr sz="900" dirty="0"/>
                     </a:p>
                   </a:txBody>
@@ -15105,7 +15147,11 @@
                         </a:spcAft>
                         <a:buNone/>
                       </a:pPr>
-                      <a:endParaRPr sz="900"/>
+                      <a:r>
+                        <a:rPr lang="en-US" sz="900" dirty="0"/>
+                        <a:t>0.8208</a:t>
+                      </a:r>
+                      <a:endParaRPr sz="900" dirty="0"/>
                     </a:p>
                   </a:txBody>
                   <a:tcPr marL="91425" marR="91425" marT="91425" marB="91425"/>
@@ -15155,10 +15201,10 @@
                         <a:buNone/>
                       </a:pPr>
                       <a:r>
-                        <a:rPr lang="en" sz="900"/>
+                        <a:rPr lang="en" sz="900" dirty="0"/>
                         <a:t>2</a:t>
                       </a:r>
-                      <a:endParaRPr sz="900"/>
+                      <a:endParaRPr sz="900" dirty="0"/>
                     </a:p>
                   </a:txBody>
                   <a:tcPr marL="91425" marR="91425" marT="91425" marB="91425"/>
@@ -15178,10 +15224,10 @@
                         <a:buNone/>
                       </a:pPr>
                       <a:r>
-                        <a:rPr lang="en" sz="900"/>
+                        <a:rPr lang="en" sz="900" dirty="0"/>
                         <a:t>Sky</a:t>
                       </a:r>
-                      <a:endParaRPr sz="900"/>
+                      <a:endParaRPr sz="900" dirty="0"/>
                     </a:p>
                   </a:txBody>
                   <a:tcPr marL="91425" marR="91425" marT="91425" marB="91425"/>
@@ -15200,7 +15246,11 @@
                         </a:spcAft>
                         <a:buNone/>
                       </a:pPr>
-                      <a:endParaRPr sz="900"/>
+                      <a:r>
+                        <a:rPr lang="en-US" sz="900" dirty="0"/>
+                        <a:t>0.7225</a:t>
+                      </a:r>
+                      <a:endParaRPr sz="900" dirty="0"/>
                     </a:p>
                   </a:txBody>
                   <a:tcPr marL="91425" marR="91425" marT="91425" marB="91425"/>
@@ -15250,10 +15300,10 @@
                         <a:buNone/>
                       </a:pPr>
                       <a:r>
-                        <a:rPr lang="en" sz="900"/>
+                        <a:rPr lang="en" sz="900" dirty="0"/>
                         <a:t>3</a:t>
                       </a:r>
-                      <a:endParaRPr sz="900"/>
+                      <a:endParaRPr sz="900" dirty="0"/>
                     </a:p>
                   </a:txBody>
                   <a:tcPr marL="91425" marR="91425" marT="91425" marB="91425"/>
@@ -15273,10 +15323,10 @@
                         <a:buNone/>
                       </a:pPr>
                       <a:r>
-                        <a:rPr lang="en" sz="900"/>
+                        <a:rPr lang="en" sz="900" dirty="0"/>
                         <a:t>Car</a:t>
                       </a:r>
-                      <a:endParaRPr sz="900"/>
+                      <a:endParaRPr sz="900" dirty="0"/>
                     </a:p>
                   </a:txBody>
                   <a:tcPr marL="91425" marR="91425" marT="91425" marB="91425"/>
@@ -15295,7 +15345,11 @@
                         </a:spcAft>
                         <a:buNone/>
                       </a:pPr>
-                      <a:endParaRPr sz="900"/>
+                      <a:r>
+                        <a:rPr lang="en-US" sz="900" dirty="0"/>
+                        <a:t>0.4265</a:t>
+                      </a:r>
+                      <a:endParaRPr sz="900" dirty="0"/>
                     </a:p>
                   </a:txBody>
                   <a:tcPr marL="91425" marR="91425" marT="91425" marB="91425"/>
@@ -15390,7 +15444,11 @@
                         </a:spcAft>
                         <a:buNone/>
                       </a:pPr>
-                      <a:endParaRPr sz="900"/>
+                      <a:r>
+                        <a:rPr lang="en-US" sz="900" dirty="0"/>
+                        <a:t>0.0000</a:t>
+                      </a:r>
+                      <a:endParaRPr sz="900" dirty="0"/>
                     </a:p>
                   </a:txBody>
                   <a:tcPr marL="91425" marR="91425" marT="91425" marB="91425"/>
@@ -15485,7 +15543,11 @@
                         </a:spcAft>
                         <a:buNone/>
                       </a:pPr>
-                      <a:endParaRPr sz="900"/>
+                      <a:r>
+                        <a:rPr lang="en-US" sz="900" dirty="0"/>
+                        <a:t>0.8544</a:t>
+                      </a:r>
+                      <a:endParaRPr sz="900" dirty="0"/>
                     </a:p>
                   </a:txBody>
                   <a:tcPr marL="91425" marR="91425" marT="91425" marB="91425"/>
@@ -15535,10 +15597,10 @@
                         <a:buNone/>
                       </a:pPr>
                       <a:r>
-                        <a:rPr lang="en" sz="900"/>
+                        <a:rPr lang="en" sz="900" dirty="0"/>
                         <a:t>6</a:t>
                       </a:r>
-                      <a:endParaRPr sz="900"/>
+                      <a:endParaRPr sz="900" dirty="0"/>
                     </a:p>
                   </a:txBody>
                   <a:tcPr marL="91425" marR="91425" marT="91425" marB="91425"/>
@@ -15558,10 +15620,10 @@
                         <a:buNone/>
                       </a:pPr>
                       <a:r>
-                        <a:rPr lang="en" sz="900"/>
+                        <a:rPr lang="en" sz="900" dirty="0"/>
                         <a:t>Pedestrian</a:t>
                       </a:r>
-                      <a:endParaRPr sz="900"/>
+                      <a:endParaRPr sz="900" dirty="0"/>
                     </a:p>
                   </a:txBody>
                   <a:tcPr marL="91425" marR="91425" marT="91425" marB="91425"/>
@@ -15580,7 +15642,11 @@
                         </a:spcAft>
                         <a:buNone/>
                       </a:pPr>
-                      <a:endParaRPr sz="900"/>
+                      <a:r>
+                        <a:rPr lang="en-US" sz="900" dirty="0"/>
+                        <a:t>0.1263</a:t>
+                      </a:r>
+                      <a:endParaRPr sz="900" dirty="0"/>
                     </a:p>
                   </a:txBody>
                   <a:tcPr marL="91425" marR="91425" marT="91425" marB="91425"/>
@@ -15630,10 +15696,10 @@
                         <a:buNone/>
                       </a:pPr>
                       <a:r>
-                        <a:rPr lang="en" sz="900"/>
+                        <a:rPr lang="en" sz="900" dirty="0"/>
                         <a:t>7</a:t>
                       </a:r>
-                      <a:endParaRPr sz="900"/>
+                      <a:endParaRPr sz="900" dirty="0"/>
                     </a:p>
                   </a:txBody>
                   <a:tcPr marL="91425" marR="91425" marT="91425" marB="91425"/>
@@ -15653,10 +15719,10 @@
                         <a:buNone/>
                       </a:pPr>
                       <a:r>
-                        <a:rPr lang="en" sz="900"/>
+                        <a:rPr lang="en" sz="900" dirty="0"/>
                         <a:t>Fence</a:t>
                       </a:r>
-                      <a:endParaRPr sz="900"/>
+                      <a:endParaRPr sz="900" dirty="0"/>
                     </a:p>
                   </a:txBody>
                   <a:tcPr marL="91425" marR="91425" marT="91425" marB="91425"/>
@@ -15675,7 +15741,11 @@
                         </a:spcAft>
                         <a:buNone/>
                       </a:pPr>
-                      <a:endParaRPr sz="900"/>
+                      <a:r>
+                        <a:rPr lang="en-US" sz="900" dirty="0"/>
+                        <a:t>0.6193</a:t>
+                      </a:r>
+                      <a:endParaRPr sz="900" dirty="0"/>
                     </a:p>
                   </a:txBody>
                   <a:tcPr marL="91425" marR="91425" marT="91425" marB="91425"/>
@@ -15725,10 +15795,10 @@
                         <a:buNone/>
                       </a:pPr>
                       <a:r>
-                        <a:rPr lang="en" sz="900"/>
+                        <a:rPr lang="en" sz="900" dirty="0"/>
                         <a:t>8</a:t>
                       </a:r>
-                      <a:endParaRPr sz="900"/>
+                      <a:endParaRPr sz="900" dirty="0"/>
                     </a:p>
                   </a:txBody>
                   <a:tcPr marL="91425" marR="91425" marT="91425" marB="91425"/>
@@ -15748,10 +15818,10 @@
                         <a:buNone/>
                       </a:pPr>
                       <a:r>
-                        <a:rPr lang="en" sz="900"/>
+                        <a:rPr lang="en" sz="900" dirty="0"/>
                         <a:t>Column_Pole</a:t>
                       </a:r>
-                      <a:endParaRPr sz="900"/>
+                      <a:endParaRPr sz="900" dirty="0"/>
                     </a:p>
                   </a:txBody>
                   <a:tcPr marL="91425" marR="91425" marT="91425" marB="91425"/>
@@ -15770,7 +15840,11 @@
                         </a:spcAft>
                         <a:buNone/>
                       </a:pPr>
-                      <a:endParaRPr sz="900"/>
+                      <a:r>
+                        <a:rPr lang="en-US" sz="900" dirty="0"/>
+                        <a:t>0.0000</a:t>
+                      </a:r>
+                      <a:endParaRPr sz="900" dirty="0"/>
                     </a:p>
                   </a:txBody>
                   <a:tcPr marL="91425" marR="91425" marT="91425" marB="91425"/>
@@ -15820,10 +15894,10 @@
                         <a:buNone/>
                       </a:pPr>
                       <a:r>
-                        <a:rPr lang="en" sz="900"/>
+                        <a:rPr lang="en" sz="900" dirty="0"/>
                         <a:t>9</a:t>
                       </a:r>
-                      <a:endParaRPr sz="900"/>
+                      <a:endParaRPr sz="900" dirty="0"/>
                     </a:p>
                   </a:txBody>
                   <a:tcPr marL="91425" marR="91425" marT="91425" marB="91425"/>
@@ -15843,10 +15917,10 @@
                         <a:buNone/>
                       </a:pPr>
                       <a:r>
-                        <a:rPr lang="en" sz="900"/>
+                        <a:rPr lang="en" sz="900" dirty="0"/>
                         <a:t>Sidewalk</a:t>
                       </a:r>
-                      <a:endParaRPr sz="900"/>
+                      <a:endParaRPr sz="900" dirty="0"/>
                     </a:p>
                   </a:txBody>
                   <a:tcPr marL="91425" marR="91425" marT="91425" marB="91425"/>
@@ -15865,7 +15939,11 @@
                         </a:spcAft>
                         <a:buNone/>
                       </a:pPr>
-                      <a:endParaRPr sz="900"/>
+                      <a:r>
+                        <a:rPr lang="en-US" sz="900" dirty="0"/>
+                        <a:t>0.5569</a:t>
+                      </a:r>
+                      <a:endParaRPr sz="900" dirty="0"/>
                     </a:p>
                   </a:txBody>
                   <a:tcPr marL="91425" marR="91425" marT="91425" marB="91425"/>
@@ -15915,10 +15993,10 @@
                         <a:buNone/>
                       </a:pPr>
                       <a:r>
-                        <a:rPr lang="en" sz="900"/>
+                        <a:rPr lang="en" sz="900" dirty="0"/>
                         <a:t>10</a:t>
                       </a:r>
-                      <a:endParaRPr sz="900"/>
+                      <a:endParaRPr sz="900" dirty="0"/>
                     </a:p>
                   </a:txBody>
                   <a:tcPr marL="91425" marR="91425" marT="91425" marB="91425"/>
@@ -15938,10 +16016,10 @@
                         <a:buNone/>
                       </a:pPr>
                       <a:r>
-                        <a:rPr lang="en" sz="900"/>
+                        <a:rPr lang="en" sz="900" dirty="0"/>
                         <a:t>Bicyclist</a:t>
                       </a:r>
-                      <a:endParaRPr sz="900"/>
+                      <a:endParaRPr sz="900" dirty="0"/>
                     </a:p>
                   </a:txBody>
                   <a:tcPr marL="91425" marR="91425" marT="91425" marB="91425"/>
@@ -15960,7 +16038,11 @@
                         </a:spcAft>
                         <a:buNone/>
                       </a:pPr>
-                      <a:endParaRPr sz="900"/>
+                      <a:r>
+                        <a:rPr lang="en-US" sz="900" dirty="0"/>
+                        <a:t>0.3459</a:t>
+                      </a:r>
+                      <a:endParaRPr sz="900" dirty="0"/>
                     </a:p>
                   </a:txBody>
                   <a:tcPr marL="91425" marR="91425" marT="91425" marB="91425"/>
@@ -16115,13 +16197,57 @@
               <a:buNone/>
             </a:pPr>
             <a:r>
-              <a:rPr lang="en" dirty="0"/>
-              <a:t>The pedistrian and column_pole have the lowest mloU. </a:t>
+              <a:rPr lang="en" sz="1400" dirty="0"/>
+              <a:t>The sky symbol and column_pole have the lowest mloU. </a:t>
             </a:r>
-            <a:endParaRPr dirty="0"/>
+          </a:p>
+          <a:p>
+            <a:pPr marL="0" lvl="0" indent="0" algn="l" rtl="0">
+              <a:spcBef>
+                <a:spcPts val="0"/>
+              </a:spcBef>
+              <a:spcAft>
+                <a:spcPts val="0"/>
+              </a:spcAft>
+              <a:buNone/>
+            </a:pPr>
+            <a:r>
+              <a:rPr lang="en" sz="1400" dirty="0"/>
+              <a:t>This is because the symbol most images have different exposure values, thus making the sky a different color. This confuses the model and the symbol blends in with the overexposed sky. Also, in simplesegmentation, the sky blends in with the road at times, thus confusing the model further. The column is very thin and is mistaken as a building, rather than a pole. The pole does not have enough distinctive features to differentiate it.</a:t>
+            </a:r>
           </a:p>
         </p:txBody>
       </p:sp>
+      <p:pic>
+        <p:nvPicPr>
+          <p:cNvPr id="3" name="Picture 2" descr="A street with buildings on the side&#10;&#10;Description automatically generated with low confidence">
+            <a:extLst>
+              <a:ext uri="{FF2B5EF4-FFF2-40B4-BE49-F238E27FC236}">
+                <a16:creationId xmlns:a16="http://schemas.microsoft.com/office/drawing/2014/main" id="{46C2DFE9-4BD9-4AA3-AAF0-3356E51076DB}"/>
+              </a:ext>
+            </a:extLst>
+          </p:cNvPr>
+          <p:cNvPicPr>
+            <a:picLocks noChangeAspect="1"/>
+          </p:cNvPicPr>
+          <p:nvPr/>
+        </p:nvPicPr>
+        <p:blipFill>
+          <a:blip r:embed="rId3"/>
+          <a:stretch>
+            <a:fillRect/>
+          </a:stretch>
+        </p:blipFill>
+        <p:spPr>
+          <a:xfrm>
+            <a:off x="3523316" y="3167629"/>
+            <a:ext cx="2634495" cy="1975871"/>
+          </a:xfrm>
+          <a:prstGeom prst="rect">
+            <a:avLst/>
+          </a:prstGeom>
+        </p:spPr>
+      </p:pic>
     </p:spTree>
   </p:cSld>
   <p:clrMapOvr>
@@ -16224,13 +16350,54 @@
               <a:buNone/>
             </a:pPr>
             <a:r>
-              <a:rPr lang="en"/>
+              <a:rPr lang="en" dirty="0"/>
               <a:t>[Paste a figure of the generated semantic segmentation from Colab. It should be a 2x3 grid, with ground truth on the top row, and your predictions on the bottom row.]</a:t>
             </a:r>
-            <a:endParaRPr/>
+          </a:p>
+          <a:p>
+            <a:pPr marL="0" lvl="0" indent="0" algn="l" rtl="0">
+              <a:spcBef>
+                <a:spcPts val="0"/>
+              </a:spcBef>
+              <a:spcAft>
+                <a:spcPts val="0"/>
+              </a:spcAft>
+              <a:buNone/>
+            </a:pPr>
+            <a:endParaRPr dirty="0"/>
           </a:p>
         </p:txBody>
       </p:sp>
+      <p:pic>
+        <p:nvPicPr>
+          <p:cNvPr id="3" name="Picture 2">
+            <a:extLst>
+              <a:ext uri="{FF2B5EF4-FFF2-40B4-BE49-F238E27FC236}">
+                <a16:creationId xmlns:a16="http://schemas.microsoft.com/office/drawing/2014/main" id="{4B1E7FE6-4309-432C-BA67-2E4E58B8B620}"/>
+              </a:ext>
+            </a:extLst>
+          </p:cNvPr>
+          <p:cNvPicPr>
+            <a:picLocks noChangeAspect="1"/>
+          </p:cNvPicPr>
+          <p:nvPr/>
+        </p:nvPicPr>
+        <p:blipFill>
+          <a:blip r:embed="rId3"/>
+          <a:stretch>
+            <a:fillRect/>
+          </a:stretch>
+        </p:blipFill>
+        <p:spPr>
+          <a:xfrm>
+            <a:off x="1854378" y="2134129"/>
+            <a:ext cx="6004680" cy="3009371"/>
+          </a:xfrm>
+          <a:prstGeom prst="rect">
+            <a:avLst/>
+          </a:prstGeom>
+        </p:spPr>
+      </p:pic>
     </p:spTree>
   </p:cSld>
   <p:clrMapOvr>

</xml_diff>